<commit_message>
Nueva slide + correciones
</commit_message>
<xml_diff>
--- a/Presentación/RF Switch.pptx
+++ b/Presentación/RF Switch.pptx
@@ -14,15 +14,16 @@
     <p:sldId id="259" r:id="rId7"/>
     <p:sldId id="260" r:id="rId8"/>
     <p:sldId id="261" r:id="rId9"/>
-    <p:sldId id="267" r:id="rId10"/>
-    <p:sldId id="262" r:id="rId11"/>
-    <p:sldId id="264" r:id="rId12"/>
-    <p:sldId id="265" r:id="rId13"/>
-    <p:sldId id="266" r:id="rId14"/>
-    <p:sldId id="273" r:id="rId15"/>
-    <p:sldId id="274" r:id="rId16"/>
-    <p:sldId id="263" r:id="rId17"/>
-    <p:sldId id="275" r:id="rId18"/>
+    <p:sldId id="277" r:id="rId10"/>
+    <p:sldId id="267" r:id="rId11"/>
+    <p:sldId id="262" r:id="rId12"/>
+    <p:sldId id="264" r:id="rId13"/>
+    <p:sldId id="265" r:id="rId14"/>
+    <p:sldId id="266" r:id="rId15"/>
+    <p:sldId id="273" r:id="rId16"/>
+    <p:sldId id="274" r:id="rId17"/>
+    <p:sldId id="263" r:id="rId18"/>
+    <p:sldId id="275" r:id="rId19"/>
   </p:sldIdLst>
   <p:sldSz cx="9144000" cy="6858000" type="screen4x3"/>
   <p:notesSz cx="6858000" cy="9144000"/>
@@ -4574,16 +4575,216 @@
             <p:ph type="body" sz="quarter" idx="13"/>
           </p:nvPr>
         </p:nvSpPr>
+        <p:spPr>
+          <a:xfrm>
+            <a:off x="554355" y="1041083"/>
+            <a:ext cx="7886700" cy="4749800"/>
+          </a:xfrm>
+        </p:spPr>
+        <p:txBody>
+          <a:bodyPr/>
+          <a:p>
+            <a:pPr marL="0" indent="0">
+              <a:buNone/>
+            </a:pPr>
+            <a:r>
+              <a:rPr lang="x-none" altLang="es-AR"/>
+              <a:t>Resultados:</a:t>
+            </a:r>
+            <a:endParaRPr lang="x-none" altLang="es-AR"/>
+          </a:p>
+          <a:p>
+            <a:pPr marL="0" indent="0">
+              <a:buNone/>
+            </a:pPr>
+            <a:endParaRPr lang="x-none" altLang="es-AR"/>
+          </a:p>
+        </p:txBody>
+      </p:sp>
+      <p:sp>
+        <p:nvSpPr>
+          <p:cNvPr id="5" name="TextBox 4"/>
+          <p:cNvSpPr txBox="1"/>
+          <p:nvPr/>
+        </p:nvSpPr>
+        <p:spPr>
+          <a:xfrm>
+            <a:off x="1033780" y="1718310"/>
+            <a:ext cx="6919595" cy="1557020"/>
+          </a:xfrm>
+          <a:prstGeom prst="rect">
+            <a:avLst/>
+          </a:prstGeom>
+          <a:noFill/>
+        </p:spPr>
+        <p:txBody>
+          <a:bodyPr wrap="none" rtlCol="0">
+            <a:spAutoFit/>
+          </a:bodyPr>
+          <a:p>
+            <a:pPr algn="l">
+              <a:lnSpc>
+                <a:spcPct val="130000"/>
+              </a:lnSpc>
+            </a:pPr>
+            <a:r>
+              <a:rPr lang="es-AR" sz="2000" b="1">
+                <a:solidFill>
+                  <a:srgbClr val="4B4D4F"/>
+                </a:solidFill>
+                <a:latin typeface="Arial" charset="0"/>
+                <a:ea typeface="Microsoft YaHei" charset="0"/>
+                <a:sym typeface="+mn-ea"/>
+              </a:rPr>
+              <a:t>S22 con puerto 2 conectado.</a:t>
+            </a:r>
+            <a:endParaRPr lang="es-AR" sz="2000" b="1">
+              <a:solidFill>
+                <a:srgbClr val="4B4D4F"/>
+              </a:solidFill>
+              <a:latin typeface="Arial" charset="0"/>
+              <a:ea typeface="Microsoft YaHei" charset="0"/>
+            </a:endParaRPr>
+          </a:p>
+          <a:p>
+            <a:pPr algn="l">
+              <a:lnSpc>
+                <a:spcPct val="130000"/>
+              </a:lnSpc>
+            </a:pPr>
+            <a:r>
+              <a:rPr lang="es-AR" sz="2000" b="1">
+                <a:solidFill>
+                  <a:srgbClr val="4B4D4F"/>
+                </a:solidFill>
+                <a:latin typeface="Arial" charset="0"/>
+                <a:ea typeface="Microsoft YaHei" charset="0"/>
+                <a:sym typeface="+mn-ea"/>
+              </a:rPr>
+              <a:t>Coeficiente de reflexion  del puerto que esta conectado.</a:t>
+            </a:r>
+            <a:endParaRPr lang="es-AR" sz="2000" b="1">
+              <a:solidFill>
+                <a:srgbClr val="4B4D4F"/>
+              </a:solidFill>
+              <a:latin typeface="Arial" charset="0"/>
+              <a:ea typeface="Microsoft YaHei" charset="0"/>
+            </a:endParaRPr>
+          </a:p>
+          <a:p>
+            <a:pPr algn="l">
+              <a:lnSpc>
+                <a:spcPct val="130000"/>
+              </a:lnSpc>
+            </a:pPr>
+            <a:endParaRPr lang="x-none" altLang="es-AR" sz="2000" b="1" dirty="0" smtClean="0">
+              <a:latin typeface="Arial" charset="0"/>
+              <a:ea typeface="微软雅黑" pitchFamily="34" charset="-122"/>
+              <a:sym typeface="+mn-ea"/>
+            </a:endParaRPr>
+          </a:p>
+          <a:p>
+            <a:pPr algn="l">
+              <a:lnSpc>
+                <a:spcPct val="130000"/>
+              </a:lnSpc>
+            </a:pPr>
+            <a:endParaRPr lang="x-none" altLang="es-AR" sz="1400" dirty="0" smtClean="0">
+              <a:latin typeface="Arial" charset="0"/>
+              <a:ea typeface="微软雅黑" pitchFamily="34" charset="-122"/>
+            </a:endParaRPr>
+          </a:p>
+        </p:txBody>
+      </p:sp>
+      <p:pic>
+        <p:nvPicPr>
+          <p:cNvPr id="12" name="Picture 3"/>
+          <p:cNvPicPr>
+            <a:picLocks noChangeAspect="1"/>
+          </p:cNvPicPr>
+          <p:nvPr/>
+        </p:nvPicPr>
+        <p:blipFill>
+          <a:blip r:embed="rId1"/>
+          <a:stretch>
+            <a:fillRect/>
+          </a:stretch>
+        </p:blipFill>
+        <p:spPr>
+          <a:xfrm>
+            <a:off x="1050290" y="2987040"/>
+            <a:ext cx="7814945" cy="2969895"/>
+          </a:xfrm>
+          <a:prstGeom prst="rect">
+            <a:avLst/>
+          </a:prstGeom>
+          <a:noFill/>
+          <a:ln w="9525">
+            <a:noFill/>
+            <a:miter/>
+          </a:ln>
+        </p:spPr>
+      </p:pic>
+    </p:spTree>
+  </p:cSld>
+  <p:clrMapOvr>
+    <a:masterClrMapping/>
+  </p:clrMapOvr>
+</p:sld>
+</file>
+
+<file path=ppt/slides/slide11.xml><?xml version="1.0" encoding="utf-8"?>
+<p:sld xmlns:a="http://schemas.openxmlformats.org/drawingml/2006/main" xmlns:r="http://schemas.openxmlformats.org/officeDocument/2006/relationships" xmlns:p="http://schemas.openxmlformats.org/presentationml/2006/main">
+  <p:cSld>
+    <p:spTree>
+      <p:nvGrpSpPr>
+        <p:cNvPr id="1" name=""/>
+        <p:cNvGrpSpPr/>
+        <p:nvPr/>
+      </p:nvGrpSpPr>
+      <p:grpSpPr/>
+      <p:sp>
+        <p:nvSpPr>
+          <p:cNvPr id="2" name="Title 1"/>
+          <p:cNvSpPr>
+            <a:spLocks noGrp="1"/>
+          </p:cNvSpPr>
+          <p:nvPr>
+            <p:ph type="title"/>
+          </p:nvPr>
+        </p:nvSpPr>
         <p:spPr/>
         <p:txBody>
           <a:bodyPr/>
           <a:p>
+            <a:r>
+              <a:rPr lang="x-none" altLang="es-AR"/>
+              <a:t>Simulación</a:t>
+            </a:r>
+            <a:endParaRPr lang="x-none" altLang="es-AR"/>
+          </a:p>
+        </p:txBody>
+      </p:sp>
+      <p:sp>
+        <p:nvSpPr>
+          <p:cNvPr id="3" name="Text Placeholder 2"/>
+          <p:cNvSpPr>
+            <a:spLocks noGrp="1"/>
+          </p:cNvSpPr>
+          <p:nvPr>
+            <p:ph type="body" sz="quarter" idx="13"/>
+          </p:nvPr>
+        </p:nvSpPr>
+        <p:spPr/>
+        <p:txBody>
+          <a:bodyPr/>
+          <a:p>
             <a:pPr marL="0" indent="0">
               <a:buNone/>
             </a:pPr>
             <a:r>
               <a:rPr lang="x-none" altLang="es-AR"/>
-              <a:t>Resultados [Qucs]:</a:t>
+              <a:t>Resultados:</a:t>
             </a:r>
             <a:endParaRPr lang="x-none" altLang="es-AR"/>
           </a:p>
@@ -4697,7 +4898,7 @@
 </p:sld>
 </file>
 
-<file path=ppt/slides/slide11.xml><?xml version="1.0" encoding="utf-8"?>
+<file path=ppt/slides/slide12.xml><?xml version="1.0" encoding="utf-8"?>
 <p:sld xmlns:a="http://schemas.openxmlformats.org/drawingml/2006/main" xmlns:r="http://schemas.openxmlformats.org/officeDocument/2006/relationships" xmlns:p="http://schemas.openxmlformats.org/presentationml/2006/main">
   <p:cSld>
     <p:spTree>
@@ -4874,7 +5075,7 @@
 </p:sld>
 </file>
 
-<file path=ppt/slides/slide12.xml><?xml version="1.0" encoding="utf-8"?>
+<file path=ppt/slides/slide13.xml><?xml version="1.0" encoding="utf-8"?>
 <p:sld xmlns:a="http://schemas.openxmlformats.org/drawingml/2006/main" xmlns:r="http://schemas.openxmlformats.org/officeDocument/2006/relationships" xmlns:p="http://schemas.openxmlformats.org/presentationml/2006/main">
   <p:cSld>
     <p:spTree>
@@ -5014,7 +5215,7 @@
 </p:sld>
 </file>
 
-<file path=ppt/slides/slide13.xml><?xml version="1.0" encoding="utf-8"?>
+<file path=ppt/slides/slide14.xml><?xml version="1.0" encoding="utf-8"?>
 <p:sld xmlns:a="http://schemas.openxmlformats.org/drawingml/2006/main" xmlns:r="http://schemas.openxmlformats.org/officeDocument/2006/relationships" xmlns:p="http://schemas.openxmlformats.org/presentationml/2006/main">
   <p:cSld>
     <p:spTree>
@@ -5191,7 +5392,7 @@
 </p:sld>
 </file>
 
-<file path=ppt/slides/slide14.xml><?xml version="1.0" encoding="utf-8"?>
+<file path=ppt/slides/slide15.xml><?xml version="1.0" encoding="utf-8"?>
 <p:sld xmlns:a="http://schemas.openxmlformats.org/drawingml/2006/main" xmlns:r="http://schemas.openxmlformats.org/officeDocument/2006/relationships" xmlns:p="http://schemas.openxmlformats.org/presentationml/2006/main">
   <p:cSld>
     <p:spTree>
@@ -5292,7 +5493,7 @@
 </p:sld>
 </file>
 
-<file path=ppt/slides/slide15.xml><?xml version="1.0" encoding="utf-8"?>
+<file path=ppt/slides/slide16.xml><?xml version="1.0" encoding="utf-8"?>
 <p:sld xmlns:a="http://schemas.openxmlformats.org/drawingml/2006/main" xmlns:r="http://schemas.openxmlformats.org/officeDocument/2006/relationships" xmlns:p="http://schemas.openxmlformats.org/presentationml/2006/main">
   <p:cSld>
     <p:spTree>
@@ -5440,8 +5641,59 @@
         <p:txBody>
           <a:bodyPr vert="horz" wrap="square" lIns="91440" tIns="45720" rIns="91440" bIns="45720" anchor="t"/>
           <a:p>
-            <a:pPr lvl="0" eaLnBrk="1" hangingPunct="1"/>
-            <a:endParaRPr lang="zh-CN" altLang="en-US" dirty="0"/>
+            <a:pPr lvl="0" eaLnBrk="1" hangingPunct="1">
+              <a:buFont typeface="Arial" charset="0"/>
+              <a:buChar char="•"/>
+            </a:pPr>
+            <a:r>
+              <a:rPr lang="x-none" altLang="zh-CN" sz="2800" b="1" dirty="0"/>
+              <a:t>Descripción del proyecto</a:t>
+            </a:r>
+            <a:endParaRPr lang="x-none" altLang="zh-CN" sz="2800" b="1" dirty="0"/>
+          </a:p>
+          <a:p>
+            <a:pPr lvl="0" eaLnBrk="1" hangingPunct="1">
+              <a:buFont typeface="Arial" charset="0"/>
+              <a:buChar char="•"/>
+            </a:pPr>
+            <a:r>
+              <a:rPr lang="x-none" altLang="zh-CN" sz="2800" b="1" dirty="0"/>
+              <a:t>Diodos PIN</a:t>
+            </a:r>
+            <a:endParaRPr lang="x-none" altLang="zh-CN" sz="2800" b="1" dirty="0"/>
+          </a:p>
+          <a:p>
+            <a:pPr lvl="0" eaLnBrk="1" hangingPunct="1">
+              <a:buFont typeface="Arial" charset="0"/>
+              <a:buChar char="•"/>
+            </a:pPr>
+            <a:r>
+              <a:rPr lang="x-none" altLang="zh-CN" sz="2800" b="1" dirty="0"/>
+              <a:t>Esquemático</a:t>
+            </a:r>
+            <a:endParaRPr lang="x-none" altLang="zh-CN" sz="2800" b="1" dirty="0"/>
+          </a:p>
+          <a:p>
+            <a:pPr lvl="0" eaLnBrk="1" hangingPunct="1">
+              <a:buFont typeface="Arial" charset="0"/>
+              <a:buChar char="•"/>
+            </a:pPr>
+            <a:r>
+              <a:rPr lang="x-none" altLang="zh-CN" sz="2800" b="1" dirty="0"/>
+              <a:t>Simulación</a:t>
+            </a:r>
+            <a:endParaRPr lang="x-none" altLang="zh-CN" sz="2800" b="1" dirty="0"/>
+          </a:p>
+          <a:p>
+            <a:pPr lvl="0" eaLnBrk="1" hangingPunct="1">
+              <a:buFont typeface="Arial" charset="0"/>
+              <a:buChar char="•"/>
+            </a:pPr>
+            <a:r>
+              <a:rPr lang="x-none" altLang="zh-CN" sz="2800" b="1" dirty="0"/>
+              <a:t>Desarrollo del PCB</a:t>
+            </a:r>
+            <a:endParaRPr lang="x-none" altLang="zh-CN" sz="2800" b="1" dirty="0"/>
           </a:p>
         </p:txBody>
       </p:sp>
@@ -5548,7 +5800,7 @@
           <a:p>
             <a:r>
               <a:rPr lang="x-none" altLang="es-AR"/>
-              <a:t>Diodo PIN</a:t>
+              <a:t>Diodos PIN</a:t>
             </a:r>
             <a:endParaRPr lang="x-none" altLang="es-AR"/>
           </a:p>
@@ -6555,6 +6807,203 @@
         </p:nvSpPr>
         <p:spPr>
           <a:xfrm>
+            <a:off x="609600" y="872808"/>
+            <a:ext cx="7886700" cy="4749800"/>
+          </a:xfrm>
+        </p:spPr>
+        <p:txBody>
+          <a:bodyPr/>
+          <a:p>
+            <a:pPr marL="0" indent="0">
+              <a:lnSpc>
+                <a:spcPct val="50000"/>
+              </a:lnSpc>
+              <a:buNone/>
+            </a:pPr>
+            <a:r>
+              <a:rPr lang="x-none" altLang="es-AR" b="1"/>
+              <a:t>Valores del diodo PIN BAR64-02V (Infineon)</a:t>
+            </a:r>
+            <a:endParaRPr lang="x-none" altLang="es-AR" b="1"/>
+          </a:p>
+          <a:p>
+            <a:pPr marL="0" indent="0" algn="ctr">
+              <a:lnSpc>
+                <a:spcPct val="50000"/>
+              </a:lnSpc>
+              <a:buNone/>
+            </a:pPr>
+            <a:r>
+              <a:rPr lang="x-none" altLang="es-AR"/>
+              <a:t>Rs: 1 ohm ; 50 ohm (polarización)</a:t>
+            </a:r>
+            <a:endParaRPr lang="x-none" altLang="es-AR"/>
+          </a:p>
+          <a:p>
+            <a:pPr marL="0" indent="0" algn="ctr">
+              <a:lnSpc>
+                <a:spcPct val="50000"/>
+              </a:lnSpc>
+              <a:buNone/>
+            </a:pPr>
+            <a:r>
+              <a:rPr lang="x-none" altLang="es-AR">
+                <a:cs typeface="Droid Sans" charset="0"/>
+              </a:rPr>
+              <a:t>L: </a:t>
+            </a:r>
+            <a:r>
+              <a:rPr lang="x-none" altLang="es-AR">
+                <a:latin typeface="Arial" charset="0"/>
+                <a:cs typeface="Droid Sans" charset="0"/>
+              </a:rPr>
+              <a:t>≈ 1 nHy (despreciable)</a:t>
+            </a:r>
+            <a:endParaRPr lang="x-none" altLang="es-AR">
+              <a:latin typeface="Arial" charset="0"/>
+              <a:cs typeface="Droid Sans" charset="0"/>
+            </a:endParaRPr>
+          </a:p>
+          <a:p>
+            <a:pPr marL="0" indent="0" algn="ctr">
+              <a:lnSpc>
+                <a:spcPct val="50000"/>
+              </a:lnSpc>
+              <a:buNone/>
+            </a:pPr>
+            <a:r>
+              <a:rPr lang="x-none" altLang="es-AR">
+                <a:latin typeface="Arial" charset="0"/>
+                <a:cs typeface="Droid Sans" charset="0"/>
+              </a:rPr>
+              <a:t>Rp: 3 Kohm @ 1.8 Ghz</a:t>
+            </a:r>
+            <a:endParaRPr lang="x-none" altLang="es-AR">
+              <a:latin typeface="Arial" charset="0"/>
+              <a:cs typeface="Droid Sans" charset="0"/>
+            </a:endParaRPr>
+          </a:p>
+          <a:p>
+            <a:pPr marL="0" indent="0" algn="ctr">
+              <a:lnSpc>
+                <a:spcPct val="50000"/>
+              </a:lnSpc>
+              <a:buNone/>
+            </a:pPr>
+            <a:r>
+              <a:rPr lang="x-none" altLang="es-AR">
+                <a:latin typeface="Arial" charset="0"/>
+                <a:cs typeface="Droid Sans" charset="0"/>
+              </a:rPr>
+              <a:t>Ct: 0.17 pF @ 1.8 Ghz</a:t>
+            </a:r>
+            <a:endParaRPr lang="x-none" altLang="es-AR">
+              <a:latin typeface="Arial" charset="0"/>
+              <a:cs typeface="Droid Sans" charset="0"/>
+            </a:endParaRPr>
+          </a:p>
+        </p:txBody>
+      </p:sp>
+      <p:pic>
+        <p:nvPicPr>
+          <p:cNvPr id="6" name="Picture 5"/>
+          <p:cNvPicPr>
+            <a:picLocks noChangeAspect="1"/>
+          </p:cNvPicPr>
+          <p:nvPr/>
+        </p:nvPicPr>
+        <p:blipFill>
+          <a:blip r:embed="rId1"/>
+          <a:stretch>
+            <a:fillRect/>
+          </a:stretch>
+        </p:blipFill>
+        <p:spPr>
+          <a:xfrm>
+            <a:off x="1291590" y="3027680"/>
+            <a:ext cx="3103245" cy="3664585"/>
+          </a:xfrm>
+          <a:prstGeom prst="rect">
+            <a:avLst/>
+          </a:prstGeom>
+        </p:spPr>
+      </p:pic>
+      <p:pic>
+        <p:nvPicPr>
+          <p:cNvPr id="7" name="Picture 6"/>
+          <p:cNvPicPr>
+            <a:picLocks noChangeAspect="1"/>
+          </p:cNvPicPr>
+          <p:nvPr/>
+        </p:nvPicPr>
+        <p:blipFill>
+          <a:blip r:embed="rId2"/>
+          <a:stretch>
+            <a:fillRect/>
+          </a:stretch>
+        </p:blipFill>
+        <p:spPr>
+          <a:xfrm>
+            <a:off x="4905375" y="3039745"/>
+            <a:ext cx="2941320" cy="3708400"/>
+          </a:xfrm>
+          <a:prstGeom prst="rect">
+            <a:avLst/>
+          </a:prstGeom>
+        </p:spPr>
+      </p:pic>
+    </p:spTree>
+  </p:cSld>
+  <p:clrMapOvr>
+    <a:masterClrMapping/>
+  </p:clrMapOvr>
+</p:sld>
+</file>
+
+<file path=ppt/slides/slide8.xml><?xml version="1.0" encoding="utf-8"?>
+<p:sld xmlns:a="http://schemas.openxmlformats.org/drawingml/2006/main" xmlns:r="http://schemas.openxmlformats.org/officeDocument/2006/relationships" xmlns:p="http://schemas.openxmlformats.org/presentationml/2006/main">
+  <p:cSld>
+    <p:spTree>
+      <p:nvGrpSpPr>
+        <p:cNvPr id="1" name=""/>
+        <p:cNvGrpSpPr/>
+        <p:nvPr/>
+      </p:nvGrpSpPr>
+      <p:grpSpPr/>
+      <p:sp>
+        <p:nvSpPr>
+          <p:cNvPr id="2" name="Title 1"/>
+          <p:cNvSpPr>
+            <a:spLocks noGrp="1"/>
+          </p:cNvSpPr>
+          <p:nvPr>
+            <p:ph type="title"/>
+          </p:nvPr>
+        </p:nvSpPr>
+        <p:spPr/>
+        <p:txBody>
+          <a:bodyPr/>
+          <a:p>
+            <a:r>
+              <a:rPr lang="x-none" altLang="es-AR"/>
+              <a:t>Simulación</a:t>
+            </a:r>
+            <a:endParaRPr lang="x-none" altLang="es-AR"/>
+          </a:p>
+        </p:txBody>
+      </p:sp>
+      <p:sp>
+        <p:nvSpPr>
+          <p:cNvPr id="3" name="Text Placeholder 2"/>
+          <p:cNvSpPr>
+            <a:spLocks noGrp="1"/>
+          </p:cNvSpPr>
+          <p:nvPr>
+            <p:ph type="body" sz="quarter" idx="13"/>
+          </p:nvPr>
+        </p:nvSpPr>
+        <p:spPr>
+          <a:xfrm>
             <a:off x="520065" y="1307148"/>
             <a:ext cx="7886700" cy="4749800"/>
           </a:xfrm>
@@ -6567,7 +7016,7 @@
             </a:pPr>
             <a:r>
               <a:rPr lang="x-none" altLang="es-AR"/>
-              <a:t>Microstrip de Qucs: (No es realmente necesaria esta slide)</a:t>
+              <a:t>Microstrip de Qucs: </a:t>
             </a:r>
             <a:endParaRPr lang="x-none" altLang="es-AR"/>
           </a:p>
@@ -6641,7 +7090,7 @@
 </p:sld>
 </file>
 
-<file path=ppt/slides/slide8.xml><?xml version="1.0" encoding="utf-8"?>
+<file path=ppt/slides/slide9.xml><?xml version="1.0" encoding="utf-8"?>
 <p:sld xmlns:a="http://schemas.openxmlformats.org/drawingml/2006/main" xmlns:r="http://schemas.openxmlformats.org/officeDocument/2006/relationships" xmlns:p="http://schemas.openxmlformats.org/presentationml/2006/main">
   <p:cSld>
     <p:spTree>
@@ -6828,8 +7277,12 @@
               <a:buNone/>
             </a:pPr>
             <a:r>
+              <a:rPr lang="x-none" altLang="es-AR" sz="2800"/>
+              <a:t>Resultados</a:t>
+            </a:r>
+            <a:r>
               <a:rPr lang="x-none" altLang="es-AR"/>
-              <a:t>Resultados:</a:t>
+              <a:t>:</a:t>
             </a:r>
             <a:endParaRPr lang="x-none" altLang="es-AR"/>
           </a:p>
@@ -6841,206 +7294,6 @@
           </a:p>
         </p:txBody>
       </p:sp>
-    </p:spTree>
-  </p:cSld>
-  <p:clrMapOvr>
-    <a:masterClrMapping/>
-  </p:clrMapOvr>
-</p:sld>
-</file>
-
-<file path=ppt/slides/slide9.xml><?xml version="1.0" encoding="utf-8"?>
-<p:sld xmlns:a="http://schemas.openxmlformats.org/drawingml/2006/main" xmlns:r="http://schemas.openxmlformats.org/officeDocument/2006/relationships" xmlns:p="http://schemas.openxmlformats.org/presentationml/2006/main">
-  <p:cSld>
-    <p:spTree>
-      <p:nvGrpSpPr>
-        <p:cNvPr id="1" name=""/>
-        <p:cNvGrpSpPr/>
-        <p:nvPr/>
-      </p:nvGrpSpPr>
-      <p:grpSpPr/>
-      <p:sp>
-        <p:nvSpPr>
-          <p:cNvPr id="2" name="Title 1"/>
-          <p:cNvSpPr>
-            <a:spLocks noGrp="1"/>
-          </p:cNvSpPr>
-          <p:nvPr>
-            <p:ph type="title"/>
-          </p:nvPr>
-        </p:nvSpPr>
-        <p:spPr/>
-        <p:txBody>
-          <a:bodyPr/>
-          <a:p>
-            <a:r>
-              <a:rPr lang="x-none" altLang="es-AR"/>
-              <a:t>Simulación</a:t>
-            </a:r>
-            <a:endParaRPr lang="x-none" altLang="es-AR"/>
-          </a:p>
-        </p:txBody>
-      </p:sp>
-      <p:sp>
-        <p:nvSpPr>
-          <p:cNvPr id="3" name="Text Placeholder 2"/>
-          <p:cNvSpPr>
-            <a:spLocks noGrp="1"/>
-          </p:cNvSpPr>
-          <p:nvPr>
-            <p:ph type="body" sz="quarter" idx="13"/>
-          </p:nvPr>
-        </p:nvSpPr>
-        <p:spPr>
-          <a:xfrm>
-            <a:off x="554355" y="1041083"/>
-            <a:ext cx="7886700" cy="4749800"/>
-          </a:xfrm>
-        </p:spPr>
-        <p:txBody>
-          <a:bodyPr/>
-          <a:p>
-            <a:pPr marL="0" indent="0">
-              <a:buNone/>
-            </a:pPr>
-            <a:r>
-              <a:rPr lang="x-none" altLang="es-AR"/>
-              <a:t>Resultados:</a:t>
-            </a:r>
-            <a:endParaRPr lang="x-none" altLang="es-AR"/>
-          </a:p>
-          <a:p>
-            <a:pPr marL="0" indent="0">
-              <a:buNone/>
-            </a:pPr>
-            <a:endParaRPr lang="x-none" altLang="es-AR"/>
-          </a:p>
-        </p:txBody>
-      </p:sp>
-      <p:sp>
-        <p:nvSpPr>
-          <p:cNvPr id="5" name="TextBox 4"/>
-          <p:cNvSpPr txBox="1"/>
-          <p:nvPr/>
-        </p:nvSpPr>
-        <p:spPr>
-          <a:xfrm>
-            <a:off x="1033780" y="1718310"/>
-            <a:ext cx="6919595" cy="1557020"/>
-          </a:xfrm>
-          <a:prstGeom prst="rect">
-            <a:avLst/>
-          </a:prstGeom>
-          <a:noFill/>
-        </p:spPr>
-        <p:txBody>
-          <a:bodyPr wrap="none" rtlCol="0">
-            <a:spAutoFit/>
-          </a:bodyPr>
-          <a:p>
-            <a:pPr algn="l">
-              <a:lnSpc>
-                <a:spcPct val="130000"/>
-              </a:lnSpc>
-            </a:pPr>
-            <a:r>
-              <a:rPr lang="es-AR" sz="2000" b="1">
-                <a:solidFill>
-                  <a:srgbClr val="4B4D4F"/>
-                </a:solidFill>
-                <a:latin typeface="Arial" charset="0"/>
-                <a:ea typeface="Microsoft YaHei" charset="0"/>
-                <a:sym typeface="+mn-ea"/>
-              </a:rPr>
-              <a:t>S22 con puerto 2 conectado.</a:t>
-            </a:r>
-            <a:endParaRPr lang="es-AR" sz="2000" b="1">
-              <a:solidFill>
-                <a:srgbClr val="4B4D4F"/>
-              </a:solidFill>
-              <a:latin typeface="Arial" charset="0"/>
-              <a:ea typeface="Microsoft YaHei" charset="0"/>
-            </a:endParaRPr>
-          </a:p>
-          <a:p>
-            <a:pPr algn="l">
-              <a:lnSpc>
-                <a:spcPct val="130000"/>
-              </a:lnSpc>
-            </a:pPr>
-            <a:r>
-              <a:rPr lang="es-AR" sz="2000" b="1">
-                <a:solidFill>
-                  <a:srgbClr val="4B4D4F"/>
-                </a:solidFill>
-                <a:latin typeface="Arial" charset="0"/>
-                <a:ea typeface="Microsoft YaHei" charset="0"/>
-                <a:sym typeface="+mn-ea"/>
-              </a:rPr>
-              <a:t>Coeficiente de reflexion  del puerto que esta conectado.</a:t>
-            </a:r>
-            <a:endParaRPr lang="es-AR" sz="2000" b="1">
-              <a:solidFill>
-                <a:srgbClr val="4B4D4F"/>
-              </a:solidFill>
-              <a:latin typeface="Arial" charset="0"/>
-              <a:ea typeface="Microsoft YaHei" charset="0"/>
-            </a:endParaRPr>
-          </a:p>
-          <a:p>
-            <a:pPr algn="l">
-              <a:lnSpc>
-                <a:spcPct val="130000"/>
-              </a:lnSpc>
-            </a:pPr>
-            <a:endParaRPr lang="x-none" altLang="es-AR" sz="2000" b="1" dirty="0" smtClean="0">
-              <a:latin typeface="Arial" charset="0"/>
-              <a:ea typeface="微软雅黑" pitchFamily="34" charset="-122"/>
-              <a:sym typeface="+mn-ea"/>
-            </a:endParaRPr>
-          </a:p>
-          <a:p>
-            <a:pPr algn="l">
-              <a:lnSpc>
-                <a:spcPct val="130000"/>
-              </a:lnSpc>
-            </a:pPr>
-            <a:endParaRPr lang="x-none" altLang="es-AR" sz="1400" dirty="0" smtClean="0">
-              <a:latin typeface="Arial" charset="0"/>
-              <a:ea typeface="微软雅黑" pitchFamily="34" charset="-122"/>
-            </a:endParaRPr>
-          </a:p>
-        </p:txBody>
-      </p:sp>
-      <p:pic>
-        <p:nvPicPr>
-          <p:cNvPr id="12" name="Picture 3"/>
-          <p:cNvPicPr>
-            <a:picLocks noChangeAspect="1"/>
-          </p:cNvPicPr>
-          <p:nvPr/>
-        </p:nvPicPr>
-        <p:blipFill>
-          <a:blip r:embed="rId1"/>
-          <a:stretch>
-            <a:fillRect/>
-          </a:stretch>
-        </p:blipFill>
-        <p:spPr>
-          <a:xfrm>
-            <a:off x="1050290" y="2987040"/>
-            <a:ext cx="7814945" cy="2969895"/>
-          </a:xfrm>
-          <a:prstGeom prst="rect">
-            <a:avLst/>
-          </a:prstGeom>
-          <a:noFill/>
-          <a:ln w="9525">
-            <a:noFill/>
-            <a:miter/>
-          </a:ln>
-        </p:spPr>
-      </p:pic>
     </p:spTree>
   </p:cSld>
   <p:clrMapOvr>

</xml_diff>